<commit_message>
updated FigS07 and others
</commit_message>
<xml_diff>
--- a/figures/FigS06.pptx
+++ b/figures/FigS06.pptx
@@ -12780,7 +12780,7 @@
         <p:spPr>
           <a:xfrm>
             <a:off x="985261" y="9227"/>
-            <a:ext cx="713657" cy="246221"/>
+            <a:ext cx="854721" cy="246221"/>
           </a:xfrm>
           <a:prstGeom prst="rect">
             <a:avLst/>
@@ -12798,7 +12798,7 @@
                 <a:latin typeface="Arial" panose="020B0604020202020204" pitchFamily="34" charset="0"/>
                 <a:cs typeface="Arial" panose="020B0604020202020204" pitchFamily="34" charset="0"/>
               </a:rPr>
-              <a:t>Left hand</a:t>
+              <a:t>Left-handed</a:t>
             </a:r>
             <a:endParaRPr kumimoji="1" lang="ja-JP" altLang="en-US" sz="1000">
               <a:latin typeface="Arial" panose="020B0604020202020204" pitchFamily="34" charset="0"/>
@@ -12822,7 +12822,7 @@
         <p:spPr>
           <a:xfrm>
             <a:off x="3363257" y="14049"/>
-            <a:ext cx="800219" cy="246221"/>
+            <a:ext cx="949299" cy="246221"/>
           </a:xfrm>
           <a:prstGeom prst="rect">
             <a:avLst/>
@@ -12840,7 +12840,7 @@
                 <a:latin typeface="Arial" panose="020B0604020202020204" pitchFamily="34" charset="0"/>
                 <a:cs typeface="Arial" panose="020B0604020202020204" pitchFamily="34" charset="0"/>
               </a:rPr>
-              <a:t>Right hand</a:t>
+              <a:t>Right-handed</a:t>
             </a:r>
             <a:endParaRPr kumimoji="1" lang="ja-JP" altLang="en-US" sz="1000">
               <a:latin typeface="Arial" panose="020B0604020202020204" pitchFamily="34" charset="0"/>

</xml_diff>